<commit_message>
install jest make smoketest
</commit_message>
<xml_diff>
--- a/doc/ReactTDD_dev.pptx
+++ b/doc/ReactTDD_dev.pptx
@@ -250,7 +250,7 @@
           <a:p>
             <a:fld id="{D17A4929-361F-4983-8942-7FCF7EB8A9A2}" type="datetimeFigureOut">
               <a:rPr lang="ko-KR" altLang="en-US" smtClean="0"/>
-              <a:t>2019-02-19</a:t>
+              <a:t>2019-02-20</a:t>
             </a:fld>
             <a:endParaRPr lang="ko-KR" altLang="en-US"/>
           </a:p>
@@ -420,7 +420,7 @@
           <a:p>
             <a:fld id="{D17A4929-361F-4983-8942-7FCF7EB8A9A2}" type="datetimeFigureOut">
               <a:rPr lang="ko-KR" altLang="en-US" smtClean="0"/>
-              <a:t>2019-02-19</a:t>
+              <a:t>2019-02-20</a:t>
             </a:fld>
             <a:endParaRPr lang="ko-KR" altLang="en-US"/>
           </a:p>
@@ -600,7 +600,7 @@
           <a:p>
             <a:fld id="{D17A4929-361F-4983-8942-7FCF7EB8A9A2}" type="datetimeFigureOut">
               <a:rPr lang="ko-KR" altLang="en-US" smtClean="0"/>
-              <a:t>2019-02-19</a:t>
+              <a:t>2019-02-20</a:t>
             </a:fld>
             <a:endParaRPr lang="ko-KR" altLang="en-US"/>
           </a:p>
@@ -770,7 +770,7 @@
           <a:p>
             <a:fld id="{D17A4929-361F-4983-8942-7FCF7EB8A9A2}" type="datetimeFigureOut">
               <a:rPr lang="ko-KR" altLang="en-US" smtClean="0"/>
-              <a:t>2019-02-19</a:t>
+              <a:t>2019-02-20</a:t>
             </a:fld>
             <a:endParaRPr lang="ko-KR" altLang="en-US"/>
           </a:p>
@@ -1016,7 +1016,7 @@
           <a:p>
             <a:fld id="{D17A4929-361F-4983-8942-7FCF7EB8A9A2}" type="datetimeFigureOut">
               <a:rPr lang="ko-KR" altLang="en-US" smtClean="0"/>
-              <a:t>2019-02-19</a:t>
+              <a:t>2019-02-20</a:t>
             </a:fld>
             <a:endParaRPr lang="ko-KR" altLang="en-US"/>
           </a:p>
@@ -1248,7 +1248,7 @@
           <a:p>
             <a:fld id="{D17A4929-361F-4983-8942-7FCF7EB8A9A2}" type="datetimeFigureOut">
               <a:rPr lang="ko-KR" altLang="en-US" smtClean="0"/>
-              <a:t>2019-02-19</a:t>
+              <a:t>2019-02-20</a:t>
             </a:fld>
             <a:endParaRPr lang="ko-KR" altLang="en-US"/>
           </a:p>
@@ -1615,7 +1615,7 @@
           <a:p>
             <a:fld id="{D17A4929-361F-4983-8942-7FCF7EB8A9A2}" type="datetimeFigureOut">
               <a:rPr lang="ko-KR" altLang="en-US" smtClean="0"/>
-              <a:t>2019-02-19</a:t>
+              <a:t>2019-02-20</a:t>
             </a:fld>
             <a:endParaRPr lang="ko-KR" altLang="en-US"/>
           </a:p>
@@ -1733,7 +1733,7 @@
           <a:p>
             <a:fld id="{D17A4929-361F-4983-8942-7FCF7EB8A9A2}" type="datetimeFigureOut">
               <a:rPr lang="ko-KR" altLang="en-US" smtClean="0"/>
-              <a:t>2019-02-19</a:t>
+              <a:t>2019-02-20</a:t>
             </a:fld>
             <a:endParaRPr lang="ko-KR" altLang="en-US"/>
           </a:p>
@@ -1828,7 +1828,7 @@
           <a:p>
             <a:fld id="{D17A4929-361F-4983-8942-7FCF7EB8A9A2}" type="datetimeFigureOut">
               <a:rPr lang="ko-KR" altLang="en-US" smtClean="0"/>
-              <a:t>2019-02-19</a:t>
+              <a:t>2019-02-20</a:t>
             </a:fld>
             <a:endParaRPr lang="ko-KR" altLang="en-US"/>
           </a:p>
@@ -2105,7 +2105,7 @@
           <a:p>
             <a:fld id="{D17A4929-361F-4983-8942-7FCF7EB8A9A2}" type="datetimeFigureOut">
               <a:rPr lang="ko-KR" altLang="en-US" smtClean="0"/>
-              <a:t>2019-02-19</a:t>
+              <a:t>2019-02-20</a:t>
             </a:fld>
             <a:endParaRPr lang="ko-KR" altLang="en-US"/>
           </a:p>
@@ -2358,7 +2358,7 @@
           <a:p>
             <a:fld id="{D17A4929-361F-4983-8942-7FCF7EB8A9A2}" type="datetimeFigureOut">
               <a:rPr lang="ko-KR" altLang="en-US" smtClean="0"/>
-              <a:t>2019-02-19</a:t>
+              <a:t>2019-02-20</a:t>
             </a:fld>
             <a:endParaRPr lang="ko-KR" altLang="en-US"/>
           </a:p>
@@ -2571,7 +2571,7 @@
           <a:p>
             <a:fld id="{D17A4929-361F-4983-8942-7FCF7EB8A9A2}" type="datetimeFigureOut">
               <a:rPr lang="ko-KR" altLang="en-US" smtClean="0"/>
-              <a:t>2019-02-19</a:t>
+              <a:t>2019-02-20</a:t>
             </a:fld>
             <a:endParaRPr lang="ko-KR" altLang="en-US"/>
           </a:p>
@@ -2997,11 +2997,7 @@
             </a:r>
             <a:r>
               <a:rPr lang="ko-KR" altLang="en-US" dirty="0" smtClean="0"/>
-              <a:t> </a:t>
-            </a:r>
-            <a:r>
-              <a:rPr lang="ko-KR" altLang="en-US" dirty="0" smtClean="0"/>
-              <a:t>개발환경</a:t>
+              <a:t> 개발환경</a:t>
             </a:r>
             <a:endParaRPr lang="ko-KR" altLang="en-US" dirty="0"/>
           </a:p>
@@ -3028,11 +3024,7 @@
             </a:r>
             <a:r>
               <a:rPr lang="en-US" altLang="ko-KR" dirty="0" smtClean="0"/>
-              <a:t> </a:t>
-            </a:r>
-            <a:r>
-              <a:rPr lang="en-US" altLang="ko-KR" dirty="0" smtClean="0"/>
-              <a:t>&amp; NPM</a:t>
+              <a:t> &amp; NPM</a:t>
             </a:r>
             <a:r>
               <a:rPr lang="ko-KR" altLang="en-US" dirty="0" smtClean="0"/>
@@ -3196,11 +3188,7 @@
             </a:r>
             <a:r>
               <a:rPr lang="ko-KR" altLang="en-US" dirty="0" smtClean="0"/>
-              <a:t> </a:t>
-            </a:r>
-            <a:r>
-              <a:rPr lang="ko-KR" altLang="en-US" dirty="0" smtClean="0"/>
-              <a:t>개발환경</a:t>
+              <a:t> 개발환경</a:t>
             </a:r>
             <a:endParaRPr lang="ko-KR" altLang="en-US" dirty="0"/>
           </a:p>
@@ -3240,11 +3228,7 @@
             </a:pPr>
             <a:r>
               <a:rPr lang="en-US" altLang="ko-KR" dirty="0" smtClean="0"/>
-              <a:t> </a:t>
-            </a:r>
-            <a:r>
-              <a:rPr lang="en-US" altLang="ko-KR" dirty="0" smtClean="0"/>
-              <a:t>- </a:t>
+              <a:t> - </a:t>
             </a:r>
             <a:r>
               <a:rPr lang="en-US" altLang="ko-KR" dirty="0">
@@ -3340,11 +3324,7 @@
             </a:r>
             <a:r>
               <a:rPr lang="ko-KR" altLang="en-US" dirty="0" smtClean="0"/>
-              <a:t> </a:t>
-            </a:r>
-            <a:r>
-              <a:rPr lang="ko-KR" altLang="en-US" dirty="0" smtClean="0"/>
-              <a:t>개발환경</a:t>
+              <a:t> 개발환경</a:t>
             </a:r>
             <a:endParaRPr lang="ko-KR" altLang="en-US" dirty="0"/>
           </a:p>
@@ -3392,11 +3372,7 @@
             </a:pPr>
             <a:r>
               <a:rPr lang="en-US" altLang="ko-KR" dirty="0" smtClean="0"/>
-              <a:t> </a:t>
-            </a:r>
-            <a:r>
-              <a:rPr lang="en-US" altLang="ko-KR" dirty="0" smtClean="0"/>
-              <a:t>- </a:t>
+              <a:t> - </a:t>
             </a:r>
             <a:r>
               <a:rPr lang="en-US" altLang="ko-KR" dirty="0">
@@ -3418,7 +3394,6 @@
               <a:rPr lang="en-US" altLang="ko-KR" dirty="0" smtClean="0"/>
               <a:t>- yarn add –dev parcel-bundler</a:t>
             </a:r>
-            <a:endParaRPr lang="en-US" altLang="ko-KR" dirty="0" smtClean="0"/>
           </a:p>
         </p:txBody>
       </p:sp>
@@ -3504,11 +3479,7 @@
             </a:r>
             <a:r>
               <a:rPr lang="ko-KR" altLang="en-US" dirty="0" smtClean="0"/>
-              <a:t> </a:t>
-            </a:r>
-            <a:r>
-              <a:rPr lang="ko-KR" altLang="en-US" dirty="0" smtClean="0"/>
-              <a:t>개발환경</a:t>
+              <a:t> 개발환경</a:t>
             </a:r>
             <a:endParaRPr lang="ko-KR" altLang="en-US" dirty="0"/>
           </a:p>
@@ -3531,11 +3502,7 @@
           <a:p>
             <a:r>
               <a:rPr lang="en-US" altLang="ko-KR" dirty="0" smtClean="0"/>
-              <a:t>React React-Dom</a:t>
-            </a:r>
-            <a:r>
-              <a:rPr lang="en-US" altLang="ko-KR" dirty="0" smtClean="0"/>
-              <a:t> </a:t>
+              <a:t>React React-Dom </a:t>
             </a:r>
             <a:r>
               <a:rPr lang="ko-KR" altLang="en-US" dirty="0" smtClean="0"/>
@@ -4050,15 +4017,7 @@
             </a:pPr>
             <a:r>
               <a:rPr lang="en-US" altLang="ko-KR" dirty="0" smtClean="0"/>
-              <a:t> </a:t>
-            </a:r>
-            <a:r>
-              <a:rPr lang="en-US" altLang="ko-KR" dirty="0" smtClean="0"/>
-              <a:t>- </a:t>
-            </a:r>
-            <a:r>
-              <a:rPr lang="en-US" altLang="ko-KR" dirty="0" smtClean="0"/>
-              <a:t>index.html</a:t>
+              <a:t> - index.html</a:t>
             </a:r>
           </a:p>
           <a:p>
@@ -4191,11 +4150,7 @@
             </a:r>
             <a:r>
               <a:rPr lang="ko-KR" altLang="en-US" dirty="0" smtClean="0"/>
-              <a:t> </a:t>
-            </a:r>
-            <a:r>
-              <a:rPr lang="ko-KR" altLang="en-US" dirty="0" smtClean="0"/>
-              <a:t>개발환경</a:t>
+              <a:t> 개발환경</a:t>
             </a:r>
             <a:endParaRPr lang="ko-KR" altLang="en-US" dirty="0"/>
           </a:p>
@@ -4218,11 +4173,7 @@
           <a:p>
             <a:r>
               <a:rPr lang="en-US" altLang="ko-KR" dirty="0" smtClean="0"/>
-              <a:t>Cypress</a:t>
-            </a:r>
-            <a:r>
-              <a:rPr lang="en-US" altLang="ko-KR" dirty="0" smtClean="0"/>
-              <a:t> </a:t>
+              <a:t>Cypress </a:t>
             </a:r>
             <a:r>
               <a:rPr lang="ko-KR" altLang="en-US" dirty="0" smtClean="0"/>
@@ -4245,11 +4196,7 @@
             </a:pPr>
             <a:r>
               <a:rPr lang="en-US" altLang="ko-KR" dirty="0" smtClean="0"/>
-              <a:t> </a:t>
-            </a:r>
-            <a:r>
-              <a:rPr lang="en-US" altLang="ko-KR" dirty="0" smtClean="0"/>
-              <a:t>- </a:t>
+              <a:t> - </a:t>
             </a:r>
             <a:r>
               <a:rPr lang="en-US" altLang="ko-KR" dirty="0">
@@ -4271,7 +4218,6 @@
               <a:rPr lang="en-US" altLang="ko-KR" dirty="0" smtClean="0"/>
               <a:t>- yarn add –dev cypress</a:t>
             </a:r>
-            <a:endParaRPr lang="en-US" altLang="ko-KR" dirty="0" smtClean="0"/>
           </a:p>
         </p:txBody>
       </p:sp>
@@ -4357,11 +4303,7 @@
             </a:r>
             <a:r>
               <a:rPr lang="ko-KR" altLang="en-US" dirty="0" smtClean="0"/>
-              <a:t> </a:t>
-            </a:r>
-            <a:r>
-              <a:rPr lang="ko-KR" altLang="en-US" dirty="0" smtClean="0"/>
-              <a:t>개발환경</a:t>
+              <a:t> 개발환경</a:t>
             </a:r>
             <a:endParaRPr lang="ko-KR" altLang="en-US" dirty="0"/>
           </a:p>
@@ -4407,11 +4349,7 @@
             </a:pPr>
             <a:r>
               <a:rPr lang="en-US" altLang="ko-KR" dirty="0" smtClean="0"/>
-              <a:t> </a:t>
-            </a:r>
-            <a:r>
-              <a:rPr lang="en-US" altLang="ko-KR" dirty="0" smtClean="0"/>
-              <a:t>- </a:t>
+              <a:t> - </a:t>
             </a:r>
             <a:r>
               <a:rPr lang="en-US" altLang="ko-KR" dirty="0">
@@ -4433,7 +4371,11 @@
             </a:pPr>
             <a:r>
               <a:rPr lang="en-US" altLang="ko-KR" dirty="0" smtClean="0"/>
-              <a:t> - yarn add –dev cypress</a:t>
+              <a:t> - yarn add –dev </a:t>
+            </a:r>
+            <a:r>
+              <a:rPr lang="en-US" altLang="ko-KR" dirty="0" smtClean="0"/>
+              <a:t>jest</a:t>
             </a:r>
             <a:endParaRPr lang="en-US" altLang="ko-KR" dirty="0" smtClean="0"/>
           </a:p>

</xml_diff>

<commit_message>
unit test of App.js wuth jest
</commit_message>
<xml_diff>
--- a/doc/ReactTDD_dev.pptx
+++ b/doc/ReactTDD_dev.pptx
@@ -13,6 +13,8 @@
     <p:sldId id="261" r:id="rId7"/>
     <p:sldId id="262" r:id="rId8"/>
     <p:sldId id="263" r:id="rId9"/>
+    <p:sldId id="264" r:id="rId10"/>
+    <p:sldId id="265" r:id="rId11"/>
   </p:sldIdLst>
   <p:sldSz cx="12192000" cy="6858000"/>
   <p:notesSz cx="6858000" cy="9144000"/>
@@ -250,7 +252,7 @@
           <a:p>
             <a:fld id="{D17A4929-361F-4983-8942-7FCF7EB8A9A2}" type="datetimeFigureOut">
               <a:rPr lang="ko-KR" altLang="en-US" smtClean="0"/>
-              <a:t>2019-02-20</a:t>
+              <a:t>2019-02-24</a:t>
             </a:fld>
             <a:endParaRPr lang="ko-KR" altLang="en-US"/>
           </a:p>
@@ -420,7 +422,7 @@
           <a:p>
             <a:fld id="{D17A4929-361F-4983-8942-7FCF7EB8A9A2}" type="datetimeFigureOut">
               <a:rPr lang="ko-KR" altLang="en-US" smtClean="0"/>
-              <a:t>2019-02-20</a:t>
+              <a:t>2019-02-24</a:t>
             </a:fld>
             <a:endParaRPr lang="ko-KR" altLang="en-US"/>
           </a:p>
@@ -600,7 +602,7 @@
           <a:p>
             <a:fld id="{D17A4929-361F-4983-8942-7FCF7EB8A9A2}" type="datetimeFigureOut">
               <a:rPr lang="ko-KR" altLang="en-US" smtClean="0"/>
-              <a:t>2019-02-20</a:t>
+              <a:t>2019-02-24</a:t>
             </a:fld>
             <a:endParaRPr lang="ko-KR" altLang="en-US"/>
           </a:p>
@@ -770,7 +772,7 @@
           <a:p>
             <a:fld id="{D17A4929-361F-4983-8942-7FCF7EB8A9A2}" type="datetimeFigureOut">
               <a:rPr lang="ko-KR" altLang="en-US" smtClean="0"/>
-              <a:t>2019-02-20</a:t>
+              <a:t>2019-02-24</a:t>
             </a:fld>
             <a:endParaRPr lang="ko-KR" altLang="en-US"/>
           </a:p>
@@ -1016,7 +1018,7 @@
           <a:p>
             <a:fld id="{D17A4929-361F-4983-8942-7FCF7EB8A9A2}" type="datetimeFigureOut">
               <a:rPr lang="ko-KR" altLang="en-US" smtClean="0"/>
-              <a:t>2019-02-20</a:t>
+              <a:t>2019-02-24</a:t>
             </a:fld>
             <a:endParaRPr lang="ko-KR" altLang="en-US"/>
           </a:p>
@@ -1248,7 +1250,7 @@
           <a:p>
             <a:fld id="{D17A4929-361F-4983-8942-7FCF7EB8A9A2}" type="datetimeFigureOut">
               <a:rPr lang="ko-KR" altLang="en-US" smtClean="0"/>
-              <a:t>2019-02-20</a:t>
+              <a:t>2019-02-24</a:t>
             </a:fld>
             <a:endParaRPr lang="ko-KR" altLang="en-US"/>
           </a:p>
@@ -1615,7 +1617,7 @@
           <a:p>
             <a:fld id="{D17A4929-361F-4983-8942-7FCF7EB8A9A2}" type="datetimeFigureOut">
               <a:rPr lang="ko-KR" altLang="en-US" smtClean="0"/>
-              <a:t>2019-02-20</a:t>
+              <a:t>2019-02-24</a:t>
             </a:fld>
             <a:endParaRPr lang="ko-KR" altLang="en-US"/>
           </a:p>
@@ -1733,7 +1735,7 @@
           <a:p>
             <a:fld id="{D17A4929-361F-4983-8942-7FCF7EB8A9A2}" type="datetimeFigureOut">
               <a:rPr lang="ko-KR" altLang="en-US" smtClean="0"/>
-              <a:t>2019-02-20</a:t>
+              <a:t>2019-02-24</a:t>
             </a:fld>
             <a:endParaRPr lang="ko-KR" altLang="en-US"/>
           </a:p>
@@ -1828,7 +1830,7 @@
           <a:p>
             <a:fld id="{D17A4929-361F-4983-8942-7FCF7EB8A9A2}" type="datetimeFigureOut">
               <a:rPr lang="ko-KR" altLang="en-US" smtClean="0"/>
-              <a:t>2019-02-20</a:t>
+              <a:t>2019-02-24</a:t>
             </a:fld>
             <a:endParaRPr lang="ko-KR" altLang="en-US"/>
           </a:p>
@@ -2105,7 +2107,7 @@
           <a:p>
             <a:fld id="{D17A4929-361F-4983-8942-7FCF7EB8A9A2}" type="datetimeFigureOut">
               <a:rPr lang="ko-KR" altLang="en-US" smtClean="0"/>
-              <a:t>2019-02-20</a:t>
+              <a:t>2019-02-24</a:t>
             </a:fld>
             <a:endParaRPr lang="ko-KR" altLang="en-US"/>
           </a:p>
@@ -2358,7 +2360,7 @@
           <a:p>
             <a:fld id="{D17A4929-361F-4983-8942-7FCF7EB8A9A2}" type="datetimeFigureOut">
               <a:rPr lang="ko-KR" altLang="en-US" smtClean="0"/>
-              <a:t>2019-02-20</a:t>
+              <a:t>2019-02-24</a:t>
             </a:fld>
             <a:endParaRPr lang="ko-KR" altLang="en-US"/>
           </a:p>
@@ -2571,7 +2573,7 @@
           <a:p>
             <a:fld id="{D17A4929-361F-4983-8942-7FCF7EB8A9A2}" type="datetimeFigureOut">
               <a:rPr lang="ko-KR" altLang="en-US" smtClean="0"/>
-              <a:t>2019-02-20</a:t>
+              <a:t>2019-02-24</a:t>
             </a:fld>
             <a:endParaRPr lang="ko-KR" altLang="en-US"/>
           </a:p>
@@ -3126,6 +3128,289 @@
 </p:sld>
 </file>
 
+<file path=ppt/slides/slide10.xml><?xml version="1.0" encoding="utf-8"?>
+<p:sld xmlns:a="http://schemas.openxmlformats.org/drawingml/2006/main" xmlns:r="http://schemas.openxmlformats.org/officeDocument/2006/relationships" xmlns:p="http://schemas.openxmlformats.org/presentationml/2006/main">
+  <p:cSld>
+    <p:spTree>
+      <p:nvGrpSpPr>
+        <p:cNvPr id="1" name=""/>
+        <p:cNvGrpSpPr/>
+        <p:nvPr/>
+      </p:nvGrpSpPr>
+      <p:grpSpPr>
+        <a:xfrm>
+          <a:off x="0" y="0"/>
+          <a:ext cx="0" cy="0"/>
+          <a:chOff x="0" y="0"/>
+          <a:chExt cx="0" cy="0"/>
+        </a:xfrm>
+      </p:grpSpPr>
+      <p:pic>
+        <p:nvPicPr>
+          <p:cNvPr id="4" name="그림 3"/>
+          <p:cNvPicPr>
+            <a:picLocks noChangeAspect="1"/>
+          </p:cNvPicPr>
+          <p:nvPr/>
+        </p:nvPicPr>
+        <p:blipFill>
+          <a:blip r:embed="rId2"/>
+          <a:stretch>
+            <a:fillRect/>
+          </a:stretch>
+        </p:blipFill>
+        <p:spPr>
+          <a:xfrm>
+            <a:off x="8102665" y="1690688"/>
+            <a:ext cx="3600450" cy="2085975"/>
+          </a:xfrm>
+          <a:prstGeom prst="rect">
+            <a:avLst/>
+          </a:prstGeom>
+        </p:spPr>
+      </p:pic>
+      <p:sp>
+        <p:nvSpPr>
+          <p:cNvPr id="2" name="제목 1"/>
+          <p:cNvSpPr>
+            <a:spLocks noGrp="1"/>
+          </p:cNvSpPr>
+          <p:nvPr>
+            <p:ph type="title"/>
+          </p:nvPr>
+        </p:nvSpPr>
+        <p:spPr/>
+        <p:txBody>
+          <a:bodyPr/>
+          <a:lstStyle/>
+          <a:p>
+            <a:r>
+              <a:rPr lang="en-US" altLang="ko-KR" dirty="0" smtClean="0"/>
+              <a:t>App.spec.js Jest Unit Test</a:t>
+            </a:r>
+            <a:endParaRPr lang="ko-KR" altLang="en-US" dirty="0"/>
+          </a:p>
+        </p:txBody>
+      </p:sp>
+      <p:sp>
+        <p:nvSpPr>
+          <p:cNvPr id="3" name="내용 개체 틀 2"/>
+          <p:cNvSpPr>
+            <a:spLocks noGrp="1"/>
+          </p:cNvSpPr>
+          <p:nvPr>
+            <p:ph idx="1"/>
+          </p:nvPr>
+        </p:nvSpPr>
+        <p:spPr/>
+        <p:txBody>
+          <a:bodyPr>
+            <a:normAutofit fontScale="77500" lnSpcReduction="20000"/>
+          </a:bodyPr>
+          <a:lstStyle/>
+          <a:p>
+            <a:r>
+              <a:rPr lang="en-US" altLang="ko-KR" dirty="0" smtClean="0"/>
+              <a:t>Setup.js </a:t>
+            </a:r>
+            <a:r>
+              <a:rPr lang="ko-KR" altLang="en-US" dirty="0" smtClean="0"/>
+              <a:t>파일 생성 </a:t>
+            </a:r>
+            <a:endParaRPr lang="en-US" altLang="ko-KR" dirty="0" smtClean="0"/>
+          </a:p>
+          <a:p>
+            <a:pPr marL="0" indent="0">
+              <a:buNone/>
+            </a:pPr>
+            <a:r>
+              <a:rPr lang="en-US" altLang="ko-KR" dirty="0" smtClean="0"/>
+              <a:t> - </a:t>
+            </a:r>
+            <a:r>
+              <a:rPr lang="en-US" altLang="ko-KR" dirty="0" smtClean="0"/>
+              <a:t>Enzyme </a:t>
+            </a:r>
+            <a:r>
+              <a:rPr lang="en-US" altLang="ko-KR" dirty="0" err="1" smtClean="0"/>
+              <a:t>Adater</a:t>
+            </a:r>
+            <a:r>
+              <a:rPr lang="en-US" altLang="ko-KR" dirty="0" smtClean="0"/>
+              <a:t> </a:t>
+            </a:r>
+            <a:r>
+              <a:rPr lang="ko-KR" altLang="en-US" dirty="0" smtClean="0"/>
+              <a:t>설정</a:t>
+            </a:r>
+            <a:endParaRPr lang="en-US" altLang="ko-KR" dirty="0" smtClean="0"/>
+          </a:p>
+          <a:p>
+            <a:pPr marL="0" indent="0">
+              <a:buNone/>
+            </a:pPr>
+            <a:r>
+              <a:rPr lang="en-US" altLang="ko-KR" dirty="0"/>
+              <a:t> </a:t>
+            </a:r>
+            <a:r>
+              <a:rPr lang="en-US" altLang="ko-KR" dirty="0" smtClean="0"/>
+              <a:t>- </a:t>
+            </a:r>
+            <a:r>
+              <a:rPr lang="en-US" altLang="ko-KR" dirty="0" err="1" smtClean="0"/>
+              <a:t>package.json</a:t>
+            </a:r>
+            <a:r>
+              <a:rPr lang="en-US" altLang="ko-KR" dirty="0" smtClean="0"/>
+              <a:t> jest =&gt; </a:t>
+            </a:r>
+            <a:r>
+              <a:rPr lang="en-US" altLang="ko-KR" dirty="0" err="1" smtClean="0"/>
+              <a:t>setupFilesAfterEnv</a:t>
+            </a:r>
+            <a:r>
+              <a:rPr lang="en-US" altLang="ko-KR" dirty="0" smtClean="0"/>
+              <a:t> </a:t>
+            </a:r>
+            <a:r>
+              <a:rPr lang="ko-KR" altLang="en-US" dirty="0" err="1" smtClean="0"/>
+              <a:t>항목설정</a:t>
+            </a:r>
+            <a:endParaRPr lang="en-US" altLang="ko-KR" dirty="0" smtClean="0"/>
+          </a:p>
+          <a:p>
+            <a:endParaRPr lang="en-US" altLang="ko-KR" dirty="0" smtClean="0"/>
+          </a:p>
+          <a:p>
+            <a:r>
+              <a:rPr lang="en-US" altLang="ko-KR" dirty="0" smtClean="0"/>
+              <a:t>App.spec.js </a:t>
+            </a:r>
+            <a:r>
+              <a:rPr lang="ko-KR" altLang="en-US" dirty="0"/>
+              <a:t>파일 생성 </a:t>
+            </a:r>
+            <a:endParaRPr lang="en-US" altLang="ko-KR" dirty="0"/>
+          </a:p>
+          <a:p>
+            <a:pPr marL="0" indent="0">
+              <a:buNone/>
+            </a:pPr>
+            <a:r>
+              <a:rPr lang="en-US" altLang="ko-KR" dirty="0"/>
+              <a:t> - </a:t>
+            </a:r>
+            <a:r>
+              <a:rPr lang="en-US" altLang="ko-KR" dirty="0" err="1" smtClean="0"/>
+              <a:t>src</a:t>
+            </a:r>
+            <a:r>
+              <a:rPr lang="en-US" altLang="ko-KR" dirty="0" smtClean="0"/>
+              <a:t>/App.js </a:t>
+            </a:r>
+            <a:r>
+              <a:rPr lang="ko-KR" altLang="en-US" dirty="0" smtClean="0"/>
+              <a:t>파일 테스트를 위한 테스트 파일</a:t>
+            </a:r>
+            <a:endParaRPr lang="en-US" altLang="ko-KR" dirty="0" smtClean="0"/>
+          </a:p>
+          <a:p>
+            <a:endParaRPr lang="en-US" altLang="ko-KR" dirty="0"/>
+          </a:p>
+          <a:p>
+            <a:r>
+              <a:rPr lang="ko-KR" altLang="en-US" dirty="0" err="1" smtClean="0"/>
+              <a:t>파싱에러</a:t>
+            </a:r>
+            <a:r>
+              <a:rPr lang="ko-KR" altLang="en-US" dirty="0" smtClean="0"/>
+              <a:t> 발생으로 아래 모듈 설치 </a:t>
+            </a:r>
+            <a:endParaRPr lang="en-US" altLang="ko-KR" dirty="0"/>
+          </a:p>
+          <a:p>
+            <a:pPr marL="0" indent="0">
+              <a:buNone/>
+            </a:pPr>
+            <a:r>
+              <a:rPr lang="en-US" altLang="ko-KR" dirty="0" smtClean="0"/>
+              <a:t> - yarn </a:t>
+            </a:r>
+            <a:r>
+              <a:rPr lang="en-US" altLang="ko-KR" dirty="0"/>
+              <a:t>add --dev @babel/core @babel/plugin-syntax-dynamic-import </a:t>
+            </a:r>
+            <a:r>
+              <a:rPr lang="en-US" altLang="ko-KR" dirty="0" err="1"/>
+              <a:t>ba</a:t>
+            </a:r>
+            <a:endParaRPr lang="en-US" altLang="ko-KR" dirty="0"/>
+          </a:p>
+          <a:p>
+            <a:pPr marL="0" indent="0">
+              <a:buNone/>
+            </a:pPr>
+            <a:r>
+              <a:rPr lang="en-US" altLang="ko-KR" dirty="0"/>
+              <a:t>bel -jest </a:t>
+            </a:r>
+            <a:r>
+              <a:rPr lang="en-US" altLang="ko-KR" dirty="0">
+                <a:hlinkClick r:id="rId3"/>
+              </a:rPr>
+              <a:t>babel-core@^</a:t>
+            </a:r>
+            <a:r>
+              <a:rPr lang="en-US" altLang="ko-KR" dirty="0" smtClean="0">
+                <a:hlinkClick r:id="rId3"/>
+              </a:rPr>
+              <a:t>7.0.0-0</a:t>
+            </a:r>
+            <a:endParaRPr lang="en-US" altLang="ko-KR" dirty="0" smtClean="0"/>
+          </a:p>
+          <a:p>
+            <a:pPr marL="0" indent="0">
+              <a:buNone/>
+            </a:pPr>
+            <a:endParaRPr lang="en-US" altLang="ko-KR" dirty="0" smtClean="0"/>
+          </a:p>
+          <a:p>
+            <a:pPr marL="0" indent="0">
+              <a:buNone/>
+            </a:pPr>
+            <a:r>
+              <a:rPr lang="en-US" altLang="ko-KR" dirty="0" smtClean="0"/>
+              <a:t> - yarn </a:t>
+            </a:r>
+            <a:r>
+              <a:rPr lang="en-US" altLang="ko-KR" dirty="0"/>
+              <a:t>add --dev @babel/preset-react</a:t>
+            </a:r>
+            <a:endParaRPr lang="en-US" altLang="ko-KR" dirty="0" smtClean="0"/>
+          </a:p>
+        </p:txBody>
+      </p:sp>
+    </p:spTree>
+    <p:extLst>
+      <p:ext uri="{BB962C8B-B14F-4D97-AF65-F5344CB8AC3E}">
+        <p14:creationId xmlns:p14="http://schemas.microsoft.com/office/powerpoint/2010/main" val="1130342769"/>
+      </p:ext>
+    </p:extLst>
+  </p:cSld>
+  <p:clrMapOvr>
+    <a:masterClrMapping/>
+  </p:clrMapOvr>
+  <p:timing>
+    <p:tnLst>
+      <p:par>
+        <p:cTn id="1" dur="indefinite" restart="never" nodeType="tmRoot"/>
+      </p:par>
+    </p:tnLst>
+  </p:timing>
+</p:sld>
+</file>
+
 <file path=ppt/slides/slide2.xml><?xml version="1.0" encoding="utf-8"?>
 <p:sld xmlns:a="http://schemas.openxmlformats.org/drawingml/2006/main" xmlns:r="http://schemas.openxmlformats.org/officeDocument/2006/relationships" xmlns:p="http://schemas.openxmlformats.org/presentationml/2006/main">
   <p:cSld>
@@ -4371,13 +4656,8 @@
             </a:pPr>
             <a:r>
               <a:rPr lang="en-US" altLang="ko-KR" dirty="0" smtClean="0"/>
-              <a:t> - yarn add –dev </a:t>
-            </a:r>
-            <a:r>
-              <a:rPr lang="en-US" altLang="ko-KR" dirty="0" smtClean="0"/>
-              <a:t>jest</a:t>
-            </a:r>
-            <a:endParaRPr lang="en-US" altLang="ko-KR" dirty="0" smtClean="0"/>
+              <a:t> - yarn add –dev jest</a:t>
+            </a:r>
           </a:p>
         </p:txBody>
       </p:sp>
@@ -4409,6 +4689,169 @@
     <p:extLst>
       <p:ext uri="{BB962C8B-B14F-4D97-AF65-F5344CB8AC3E}">
         <p14:creationId xmlns:p14="http://schemas.microsoft.com/office/powerpoint/2010/main" val="1265776232"/>
+      </p:ext>
+    </p:extLst>
+  </p:cSld>
+  <p:clrMapOvr>
+    <a:masterClrMapping/>
+  </p:clrMapOvr>
+  <p:timing>
+    <p:tnLst>
+      <p:par>
+        <p:cTn id="1" dur="indefinite" restart="never" nodeType="tmRoot"/>
+      </p:par>
+    </p:tnLst>
+  </p:timing>
+</p:sld>
+</file>
+
+<file path=ppt/slides/slide9.xml><?xml version="1.0" encoding="utf-8"?>
+<p:sld xmlns:a="http://schemas.openxmlformats.org/drawingml/2006/main" xmlns:r="http://schemas.openxmlformats.org/officeDocument/2006/relationships" xmlns:p="http://schemas.openxmlformats.org/presentationml/2006/main">
+  <p:cSld>
+    <p:spTree>
+      <p:nvGrpSpPr>
+        <p:cNvPr id="1" name=""/>
+        <p:cNvGrpSpPr/>
+        <p:nvPr/>
+      </p:nvGrpSpPr>
+      <p:grpSpPr>
+        <a:xfrm>
+          <a:off x="0" y="0"/>
+          <a:ext cx="0" cy="0"/>
+          <a:chOff x="0" y="0"/>
+          <a:chExt cx="0" cy="0"/>
+        </a:xfrm>
+      </p:grpSpPr>
+      <p:pic>
+        <p:nvPicPr>
+          <p:cNvPr id="5" name="그림 4"/>
+          <p:cNvPicPr>
+            <a:picLocks noChangeAspect="1"/>
+          </p:cNvPicPr>
+          <p:nvPr/>
+        </p:nvPicPr>
+        <p:blipFill>
+          <a:blip r:embed="rId2"/>
+          <a:stretch>
+            <a:fillRect/>
+          </a:stretch>
+        </p:blipFill>
+        <p:spPr>
+          <a:xfrm>
+            <a:off x="6096000" y="1825625"/>
+            <a:ext cx="5844436" cy="4848225"/>
+          </a:xfrm>
+          <a:prstGeom prst="rect">
+            <a:avLst/>
+          </a:prstGeom>
+        </p:spPr>
+      </p:pic>
+      <p:sp>
+        <p:nvSpPr>
+          <p:cNvPr id="2" name="제목 1"/>
+          <p:cNvSpPr>
+            <a:spLocks noGrp="1"/>
+          </p:cNvSpPr>
+          <p:nvPr>
+            <p:ph type="title"/>
+          </p:nvPr>
+        </p:nvSpPr>
+        <p:spPr/>
+        <p:txBody>
+          <a:bodyPr/>
+          <a:lstStyle/>
+          <a:p>
+            <a:r>
+              <a:rPr lang="en-US" altLang="ko-KR" dirty="0"/>
+              <a:t>React</a:t>
+            </a:r>
+            <a:r>
+              <a:rPr lang="ko-KR" altLang="en-US" dirty="0" smtClean="0"/>
+              <a:t> 개발환경</a:t>
+            </a:r>
+            <a:endParaRPr lang="ko-KR" altLang="en-US" dirty="0"/>
+          </a:p>
+        </p:txBody>
+      </p:sp>
+      <p:sp>
+        <p:nvSpPr>
+          <p:cNvPr id="3" name="내용 개체 틀 2"/>
+          <p:cNvSpPr>
+            <a:spLocks noGrp="1"/>
+          </p:cNvSpPr>
+          <p:nvPr>
+            <p:ph idx="1"/>
+          </p:nvPr>
+        </p:nvSpPr>
+        <p:spPr/>
+        <p:txBody>
+          <a:bodyPr/>
+          <a:lstStyle/>
+          <a:p>
+            <a:r>
+              <a:rPr lang="en-US" altLang="ko-KR" dirty="0" smtClean="0"/>
+              <a:t>Enzyme </a:t>
+            </a:r>
+            <a:r>
+              <a:rPr lang="ko-KR" altLang="en-US" dirty="0" smtClean="0"/>
+              <a:t>설치 </a:t>
+            </a:r>
+            <a:endParaRPr lang="en-US" altLang="ko-KR" dirty="0" smtClean="0"/>
+          </a:p>
+          <a:p>
+            <a:pPr marL="0" indent="0">
+              <a:buNone/>
+            </a:pPr>
+            <a:r>
+              <a:rPr lang="en-US" altLang="ko-KR" dirty="0" smtClean="0"/>
+              <a:t> - </a:t>
+            </a:r>
+            <a:r>
+              <a:rPr lang="en-US" altLang="ko-KR" dirty="0" err="1" smtClean="0"/>
+              <a:t>javaScript</a:t>
+            </a:r>
+            <a:r>
+              <a:rPr lang="en-US" altLang="ko-KR" dirty="0" smtClean="0"/>
+              <a:t> test utility for react</a:t>
+            </a:r>
+          </a:p>
+          <a:p>
+            <a:pPr marL="0" indent="0">
+              <a:buNone/>
+            </a:pPr>
+            <a:r>
+              <a:rPr lang="en-US" altLang="ko-KR" dirty="0" smtClean="0"/>
+              <a:t> - </a:t>
+            </a:r>
+            <a:r>
+              <a:rPr lang="en-US" altLang="ko-KR" dirty="0">
+                <a:hlinkClick r:id="rId3"/>
+              </a:rPr>
+              <a:t>https://</a:t>
+            </a:r>
+            <a:r>
+              <a:rPr lang="en-US" altLang="ko-KR" dirty="0" smtClean="0">
+                <a:hlinkClick r:id="rId3"/>
+              </a:rPr>
+              <a:t>airbnb.io/enzyme</a:t>
+            </a:r>
+            <a:endParaRPr lang="en-US" altLang="ko-KR" dirty="0" smtClean="0"/>
+          </a:p>
+          <a:p>
+            <a:pPr marL="0" indent="0">
+              <a:buNone/>
+            </a:pPr>
+            <a:r>
+              <a:rPr lang="en-US" altLang="ko-KR" dirty="0" smtClean="0"/>
+              <a:t> - yarn add –dev enzyme enzyme-adapter-react-16</a:t>
+            </a:r>
+          </a:p>
+        </p:txBody>
+      </p:sp>
+    </p:spTree>
+    <p:extLst>
+      <p:ext uri="{BB962C8B-B14F-4D97-AF65-F5344CB8AC3E}">
+        <p14:creationId xmlns:p14="http://schemas.microsoft.com/office/powerpoint/2010/main" val="2721089705"/>
       </p:ext>
     </p:extLst>
   </p:cSld>

</xml_diff>

<commit_message>
add new restaurant react tdd
</commit_message>
<xml_diff>
--- a/doc/ReactTDD_dev.pptx
+++ b/doc/ReactTDD_dev.pptx
@@ -16,6 +16,7 @@
     <p:sldId id="264" r:id="rId10"/>
     <p:sldId id="265" r:id="rId11"/>
     <p:sldId id="266" r:id="rId12"/>
+    <p:sldId id="267" r:id="rId13"/>
   </p:sldIdLst>
   <p:sldSz cx="12192000" cy="6858000"/>
   <p:notesSz cx="6858000" cy="9144000"/>
@@ -253,7 +254,7 @@
           <a:p>
             <a:fld id="{D17A4929-361F-4983-8942-7FCF7EB8A9A2}" type="datetimeFigureOut">
               <a:rPr lang="ko-KR" altLang="en-US" smtClean="0"/>
-              <a:t>2019-02-26</a:t>
+              <a:t>2019-03-06</a:t>
             </a:fld>
             <a:endParaRPr lang="ko-KR" altLang="en-US"/>
           </a:p>
@@ -423,7 +424,7 @@
           <a:p>
             <a:fld id="{D17A4929-361F-4983-8942-7FCF7EB8A9A2}" type="datetimeFigureOut">
               <a:rPr lang="ko-KR" altLang="en-US" smtClean="0"/>
-              <a:t>2019-02-26</a:t>
+              <a:t>2019-03-06</a:t>
             </a:fld>
             <a:endParaRPr lang="ko-KR" altLang="en-US"/>
           </a:p>
@@ -603,7 +604,7 @@
           <a:p>
             <a:fld id="{D17A4929-361F-4983-8942-7FCF7EB8A9A2}" type="datetimeFigureOut">
               <a:rPr lang="ko-KR" altLang="en-US" smtClean="0"/>
-              <a:t>2019-02-26</a:t>
+              <a:t>2019-03-06</a:t>
             </a:fld>
             <a:endParaRPr lang="ko-KR" altLang="en-US"/>
           </a:p>
@@ -773,7 +774,7 @@
           <a:p>
             <a:fld id="{D17A4929-361F-4983-8942-7FCF7EB8A9A2}" type="datetimeFigureOut">
               <a:rPr lang="ko-KR" altLang="en-US" smtClean="0"/>
-              <a:t>2019-02-26</a:t>
+              <a:t>2019-03-06</a:t>
             </a:fld>
             <a:endParaRPr lang="ko-KR" altLang="en-US"/>
           </a:p>
@@ -1019,7 +1020,7 @@
           <a:p>
             <a:fld id="{D17A4929-361F-4983-8942-7FCF7EB8A9A2}" type="datetimeFigureOut">
               <a:rPr lang="ko-KR" altLang="en-US" smtClean="0"/>
-              <a:t>2019-02-26</a:t>
+              <a:t>2019-03-06</a:t>
             </a:fld>
             <a:endParaRPr lang="ko-KR" altLang="en-US"/>
           </a:p>
@@ -1251,7 +1252,7 @@
           <a:p>
             <a:fld id="{D17A4929-361F-4983-8942-7FCF7EB8A9A2}" type="datetimeFigureOut">
               <a:rPr lang="ko-KR" altLang="en-US" smtClean="0"/>
-              <a:t>2019-02-26</a:t>
+              <a:t>2019-03-06</a:t>
             </a:fld>
             <a:endParaRPr lang="ko-KR" altLang="en-US"/>
           </a:p>
@@ -1618,7 +1619,7 @@
           <a:p>
             <a:fld id="{D17A4929-361F-4983-8942-7FCF7EB8A9A2}" type="datetimeFigureOut">
               <a:rPr lang="ko-KR" altLang="en-US" smtClean="0"/>
-              <a:t>2019-02-26</a:t>
+              <a:t>2019-03-06</a:t>
             </a:fld>
             <a:endParaRPr lang="ko-KR" altLang="en-US"/>
           </a:p>
@@ -1736,7 +1737,7 @@
           <a:p>
             <a:fld id="{D17A4929-361F-4983-8942-7FCF7EB8A9A2}" type="datetimeFigureOut">
               <a:rPr lang="ko-KR" altLang="en-US" smtClean="0"/>
-              <a:t>2019-02-26</a:t>
+              <a:t>2019-03-06</a:t>
             </a:fld>
             <a:endParaRPr lang="ko-KR" altLang="en-US"/>
           </a:p>
@@ -1831,7 +1832,7 @@
           <a:p>
             <a:fld id="{D17A4929-361F-4983-8942-7FCF7EB8A9A2}" type="datetimeFigureOut">
               <a:rPr lang="ko-KR" altLang="en-US" smtClean="0"/>
-              <a:t>2019-02-26</a:t>
+              <a:t>2019-03-06</a:t>
             </a:fld>
             <a:endParaRPr lang="ko-KR" altLang="en-US"/>
           </a:p>
@@ -2108,7 +2109,7 @@
           <a:p>
             <a:fld id="{D17A4929-361F-4983-8942-7FCF7EB8A9A2}" type="datetimeFigureOut">
               <a:rPr lang="ko-KR" altLang="en-US" smtClean="0"/>
-              <a:t>2019-02-26</a:t>
+              <a:t>2019-03-06</a:t>
             </a:fld>
             <a:endParaRPr lang="ko-KR" altLang="en-US"/>
           </a:p>
@@ -2361,7 +2362,7 @@
           <a:p>
             <a:fld id="{D17A4929-361F-4983-8942-7FCF7EB8A9A2}" type="datetimeFigureOut">
               <a:rPr lang="ko-KR" altLang="en-US" smtClean="0"/>
-              <a:t>2019-02-26</a:t>
+              <a:t>2019-03-06</a:t>
             </a:fld>
             <a:endParaRPr lang="ko-KR" altLang="en-US"/>
           </a:p>
@@ -2574,7 +2575,7 @@
           <a:p>
             <a:fld id="{D17A4929-361F-4983-8942-7FCF7EB8A9A2}" type="datetimeFigureOut">
               <a:rPr lang="ko-KR" altLang="en-US" smtClean="0"/>
-              <a:t>2019-02-26</a:t>
+              <a:t>2019-03-06</a:t>
             </a:fld>
             <a:endParaRPr lang="ko-KR" altLang="en-US"/>
           </a:p>
@@ -3632,7 +3633,6 @@
               <a:rPr lang="en-US" altLang="ko-KR" dirty="0" smtClean="0"/>
               <a:t>-plugin-cypress</a:t>
             </a:r>
-            <a:endParaRPr lang="en-US" altLang="ko-KR" dirty="0" smtClean="0"/>
           </a:p>
           <a:p>
             <a:pPr marL="0" indent="0">
@@ -3640,11 +3640,7 @@
             </a:pPr>
             <a:r>
               <a:rPr lang="en-US" altLang="ko-KR" dirty="0" smtClean="0"/>
-              <a:t> </a:t>
-            </a:r>
-            <a:r>
-              <a:rPr lang="en-US" altLang="ko-KR" dirty="0" smtClean="0"/>
-              <a:t>- .</a:t>
+              <a:t> - .</a:t>
             </a:r>
             <a:r>
               <a:rPr lang="en-US" altLang="ko-KR" dirty="0" err="1" smtClean="0"/>
@@ -3676,6 +3672,282 @@
     <p:extLst>
       <p:ext uri="{BB962C8B-B14F-4D97-AF65-F5344CB8AC3E}">
         <p14:creationId xmlns:p14="http://schemas.microsoft.com/office/powerpoint/2010/main" val="4075487366"/>
+      </p:ext>
+    </p:extLst>
+  </p:cSld>
+  <p:clrMapOvr>
+    <a:masterClrMapping/>
+  </p:clrMapOvr>
+  <p:timing>
+    <p:tnLst>
+      <p:par>
+        <p:cTn id="1" dur="indefinite" restart="never" nodeType="tmRoot"/>
+      </p:par>
+    </p:tnLst>
+  </p:timing>
+</p:sld>
+</file>
+
+<file path=ppt/slides/slide12.xml><?xml version="1.0" encoding="utf-8"?>
+<p:sld xmlns:a="http://schemas.openxmlformats.org/drawingml/2006/main" xmlns:r="http://schemas.openxmlformats.org/officeDocument/2006/relationships" xmlns:p="http://schemas.openxmlformats.org/presentationml/2006/main">
+  <p:cSld>
+    <p:spTree>
+      <p:nvGrpSpPr>
+        <p:cNvPr id="1" name=""/>
+        <p:cNvGrpSpPr/>
+        <p:nvPr/>
+      </p:nvGrpSpPr>
+      <p:grpSpPr>
+        <a:xfrm>
+          <a:off x="0" y="0"/>
+          <a:ext cx="0" cy="0"/>
+          <a:chOff x="0" y="0"/>
+          <a:chExt cx="0" cy="0"/>
+        </a:xfrm>
+      </p:grpSpPr>
+      <p:pic>
+        <p:nvPicPr>
+          <p:cNvPr id="4" name="그림 3"/>
+          <p:cNvPicPr>
+            <a:picLocks noChangeAspect="1"/>
+          </p:cNvPicPr>
+          <p:nvPr/>
+        </p:nvPicPr>
+        <p:blipFill>
+          <a:blip r:embed="rId2"/>
+          <a:stretch>
+            <a:fillRect/>
+          </a:stretch>
+        </p:blipFill>
+        <p:spPr>
+          <a:xfrm>
+            <a:off x="8102665" y="1690688"/>
+            <a:ext cx="3600450" cy="2085975"/>
+          </a:xfrm>
+          <a:prstGeom prst="rect">
+            <a:avLst/>
+          </a:prstGeom>
+        </p:spPr>
+      </p:pic>
+      <p:sp>
+        <p:nvSpPr>
+          <p:cNvPr id="2" name="제목 1"/>
+          <p:cNvSpPr>
+            <a:spLocks noGrp="1"/>
+          </p:cNvSpPr>
+          <p:nvPr>
+            <p:ph type="title"/>
+          </p:nvPr>
+        </p:nvSpPr>
+        <p:spPr/>
+        <p:txBody>
+          <a:bodyPr/>
+          <a:lstStyle/>
+          <a:p>
+            <a:r>
+              <a:rPr lang="en-US" altLang="ko-KR" dirty="0" smtClean="0"/>
+              <a:t>Cypress e2e Test </a:t>
+            </a:r>
+            <a:r>
+              <a:rPr lang="en-US" altLang="ko-KR" dirty="0" err="1" smtClean="0"/>
+              <a:t>Adding_a</a:t>
+            </a:r>
+            <a:r>
+              <a:rPr lang="en-US" altLang="ko-KR" dirty="0" err="1" smtClean="0"/>
+              <a:t>_restaurant</a:t>
+            </a:r>
+            <a:endParaRPr lang="ko-KR" altLang="en-US" dirty="0"/>
+          </a:p>
+        </p:txBody>
+      </p:sp>
+      <p:sp>
+        <p:nvSpPr>
+          <p:cNvPr id="3" name="내용 개체 틀 2"/>
+          <p:cNvSpPr>
+            <a:spLocks noGrp="1"/>
+          </p:cNvSpPr>
+          <p:nvPr>
+            <p:ph idx="1"/>
+          </p:nvPr>
+        </p:nvSpPr>
+        <p:spPr/>
+        <p:txBody>
+          <a:bodyPr>
+            <a:normAutofit fontScale="85000" lnSpcReduction="20000"/>
+          </a:bodyPr>
+          <a:lstStyle/>
+          <a:p>
+            <a:r>
+              <a:rPr lang="en-US" altLang="ko-KR" dirty="0"/>
+              <a:t>a</a:t>
+            </a:r>
+            <a:r>
+              <a:rPr lang="en-US" altLang="ko-KR" dirty="0" smtClean="0"/>
+              <a:t>dding_a_restaurant_spec</a:t>
+            </a:r>
+            <a:r>
+              <a:rPr lang="en-US" altLang="ko-KR" dirty="0" smtClean="0"/>
+              <a:t>.js </a:t>
+            </a:r>
+            <a:r>
+              <a:rPr lang="ko-KR" altLang="en-US" dirty="0" smtClean="0"/>
+              <a:t>파일 생성 </a:t>
+            </a:r>
+            <a:endParaRPr lang="en-US" altLang="ko-KR" dirty="0" smtClean="0"/>
+          </a:p>
+          <a:p>
+            <a:pPr marL="0" indent="0">
+              <a:buNone/>
+            </a:pPr>
+            <a:r>
+              <a:rPr lang="en-US" altLang="ko-KR" dirty="0" smtClean="0"/>
+              <a:t> - </a:t>
+            </a:r>
+            <a:r>
+              <a:rPr lang="en-US" altLang="ko-KR" dirty="0" smtClean="0"/>
+              <a:t>cypress </a:t>
+            </a:r>
+            <a:r>
+              <a:rPr lang="en-US" altLang="ko-KR" dirty="0" smtClean="0"/>
+              <a:t>e2e </a:t>
+            </a:r>
+            <a:r>
+              <a:rPr lang="ko-KR" altLang="en-US" dirty="0" smtClean="0"/>
+              <a:t>테스트 절차 정의</a:t>
+            </a:r>
+            <a:endParaRPr lang="en-US" altLang="ko-KR" dirty="0" smtClean="0"/>
+          </a:p>
+          <a:p>
+            <a:pPr marL="0" indent="0">
+              <a:buNone/>
+            </a:pPr>
+            <a:r>
+              <a:rPr lang="en-US" altLang="ko-KR" dirty="0"/>
+              <a:t> </a:t>
+            </a:r>
+            <a:endParaRPr lang="en-US" altLang="ko-KR" dirty="0" smtClean="0"/>
+          </a:p>
+          <a:p>
+            <a:r>
+              <a:rPr lang="en-US" altLang="ko-KR" dirty="0" smtClean="0"/>
+              <a:t>RestaurantListPage.js </a:t>
+            </a:r>
+            <a:r>
+              <a:rPr lang="ko-KR" altLang="en-US" dirty="0"/>
+              <a:t>파일 생성 </a:t>
+            </a:r>
+            <a:endParaRPr lang="en-US" altLang="ko-KR" dirty="0"/>
+          </a:p>
+          <a:p>
+            <a:pPr marL="0" indent="0">
+              <a:buNone/>
+            </a:pPr>
+            <a:r>
+              <a:rPr lang="en-US" altLang="ko-KR" dirty="0"/>
+              <a:t> - </a:t>
+            </a:r>
+            <a:r>
+              <a:rPr lang="ko-KR" altLang="en-US" dirty="0" smtClean="0"/>
+              <a:t>레스토랑 등록 </a:t>
+            </a:r>
+            <a:r>
+              <a:rPr lang="en-US" altLang="ko-KR" dirty="0" err="1" smtClean="0"/>
+              <a:t>MainPage</a:t>
+            </a:r>
+            <a:endParaRPr lang="en-US" altLang="ko-KR" dirty="0" smtClean="0"/>
+          </a:p>
+          <a:p>
+            <a:endParaRPr lang="en-US" altLang="ko-KR" dirty="0"/>
+          </a:p>
+          <a:p>
+            <a:r>
+              <a:rPr lang="en-US" altLang="ko-KR" dirty="0" smtClean="0"/>
+              <a:t>NewRestaurantForm.js </a:t>
+            </a:r>
+            <a:r>
+              <a:rPr lang="ko-KR" altLang="en-US" dirty="0" smtClean="0"/>
+              <a:t>파일 생성</a:t>
+            </a:r>
+            <a:endParaRPr lang="en-US" altLang="ko-KR" dirty="0"/>
+          </a:p>
+          <a:p>
+            <a:pPr marL="0" indent="0">
+              <a:buNone/>
+            </a:pPr>
+            <a:r>
+              <a:rPr lang="en-US" altLang="ko-KR" dirty="0" smtClean="0"/>
+              <a:t> - </a:t>
+            </a:r>
+            <a:r>
+              <a:rPr lang="en-US" altLang="ko-KR" dirty="0" err="1" smtClean="0"/>
+              <a:t>InputBox</a:t>
+            </a:r>
+            <a:r>
+              <a:rPr lang="ko-KR" altLang="en-US" dirty="0" smtClean="0"/>
+              <a:t>와 </a:t>
+            </a:r>
+            <a:r>
+              <a:rPr lang="ko-KR" altLang="en-US" dirty="0" err="1" smtClean="0"/>
+              <a:t>버튼이벤트</a:t>
+            </a:r>
+            <a:r>
+              <a:rPr lang="ko-KR" altLang="en-US" dirty="0" smtClean="0"/>
+              <a:t> 정의 </a:t>
+            </a:r>
+            <a:endParaRPr lang="en-US" altLang="ko-KR" dirty="0" smtClean="0"/>
+          </a:p>
+          <a:p>
+            <a:endParaRPr lang="en-US" altLang="ko-KR" dirty="0" smtClean="0"/>
+          </a:p>
+          <a:p>
+            <a:r>
+              <a:rPr lang="en-US" altLang="ko-KR" dirty="0" smtClean="0"/>
+              <a:t>RestaurantList.js </a:t>
+            </a:r>
+            <a:r>
+              <a:rPr lang="ko-KR" altLang="en-US" dirty="0"/>
+              <a:t>파일 생성</a:t>
+            </a:r>
+            <a:endParaRPr lang="en-US" altLang="ko-KR" dirty="0"/>
+          </a:p>
+          <a:p>
+            <a:pPr marL="0" indent="0">
+              <a:buNone/>
+            </a:pPr>
+            <a:r>
+              <a:rPr lang="en-US" altLang="ko-KR" dirty="0"/>
+              <a:t> - </a:t>
+            </a:r>
+            <a:r>
+              <a:rPr lang="en-US" altLang="ko-KR" dirty="0" smtClean="0"/>
+              <a:t>Save</a:t>
+            </a:r>
+            <a:r>
+              <a:rPr lang="ko-KR" altLang="en-US" dirty="0" smtClean="0"/>
+              <a:t>버튼 </a:t>
+            </a:r>
+            <a:r>
+              <a:rPr lang="ko-KR" altLang="en-US" dirty="0" err="1" smtClean="0"/>
+              <a:t>클릭시</a:t>
+            </a:r>
+            <a:r>
+              <a:rPr lang="ko-KR" altLang="en-US" dirty="0" smtClean="0"/>
+              <a:t> 리스트 화면에 출력</a:t>
+            </a:r>
+            <a:endParaRPr lang="en-US" altLang="ko-KR" dirty="0"/>
+          </a:p>
+          <a:p>
+            <a:pPr marL="0" indent="0">
+              <a:buNone/>
+            </a:pPr>
+            <a:endParaRPr lang="en-US" altLang="ko-KR" dirty="0" smtClean="0"/>
+          </a:p>
+        </p:txBody>
+      </p:sp>
+    </p:spTree>
+    <p:extLst>
+      <p:ext uri="{BB962C8B-B14F-4D97-AF65-F5344CB8AC3E}">
+        <p14:creationId xmlns:p14="http://schemas.microsoft.com/office/powerpoint/2010/main" val="495317523"/>
       </p:ext>
     </p:extLst>
   </p:cSld>

</xml_diff>